<commit_message>
client deck PPTX/PDF を client-proposal.html と完全同期
全10スライドを「未来の自分からの言葉・ブレない軸」フレーミングに統一:
- Cover: 未来の自分は、今のあなたに何を言いますか
- Why: AI→軸の選択、言葉が消える→ブレる、脳科学、三層保管
- Approach: 未来の自分との対話→軸の言語化→永続化→三層格納
- Process: 初回対話→軸の言語化→制作→三層分散保管・納品
- Audience: ブレない軸を必要とする6タイプ
- Deliverables: デジタルコンパニオン→ブレない軸の永続化
- Investment: 未来の自分からの言葉を、どこまで深く刻むか
- CTA: 全ステップを軸フレーミングに統一

Co-Authored-By: Claude Opus 4.6 <noreply@anthropic.com>
</commit_message>
<xml_diff>
--- a/tokistorage-client-deck.pptx
+++ b/tokistorage-client-deck.pptx
@@ -3288,8 +3288,8 @@
                 </a:solidFill>
                 <a:latin typeface="IPAPGothic"/>
               </a:rPr>
-              <a:t>100年後に、
-何を残しますか。</a:t>
+              <a:t>未来の自分は、
+今のあなたに何を言いますか。</a:t>
             </a:r>
           </a:p>
         </p:txBody>
@@ -3333,7 +3333,8 @@
                 <a:latin typeface="IPAPGothic"/>
               </a:rPr>
               <a:t>AIがあらゆる問いに答える時代。
-しかしこの問いだけは、あなた自身にしか答えられない。</a:t>
+しかしこの問いだけは、あなた自身にしか答えられない。
+その言葉を三層に永続化することで、ブレない軸が生まれます。</a:t>
             </a:r>
           </a:p>
         </p:txBody>
@@ -4016,7 +4017,7 @@
                 </a:solidFill>
                 <a:latin typeface="IPAPGothic"/>
               </a:rPr>
-              <a:t>AIは「最適解」を出す。しかし「何を残すか」は決められない。意味の選択は、あなたにしかできない。</a:t>
+              <a:t>AIが答えられない、ただひとつの問い──未来の自分の声</a:t>
             </a:r>
           </a:p>
         </p:txBody>
@@ -4190,7 +4191,7 @@
                 </a:solidFill>
                 <a:latin typeface="IPAPGothic"/>
               </a:rPr>
-              <a:t>AIは答えを出す。しかし「問い」は立てられない。</a:t>
+              <a:t>AIは「最適解」を出す。しかし「あなたの軸」は決められない。</a:t>
             </a:r>
           </a:p>
         </p:txBody>
@@ -4233,7 +4234,7 @@
                 </a:solidFill>
                 <a:latin typeface="IPAPGothic"/>
               </a:rPr>
-              <a:t>生成AIは調査・分析・戦略を瞬時に出力します。しかし「100年後に何を残すか」——この問いへの答えは、あなたの人生の文脈からしか生まれません。</a:t>
+              <a:t>生成AIは調査・分析・戦略を瞬時に出力します。しかし「未来の自分は今の自分に何を言うか」——この問いへの答えは、あなたの人生の文脈からしか生まれません。最適化ではなく、軸の選択です。</a:t>
             </a:r>
           </a:p>
         </p:txBody>
@@ -4364,7 +4365,7 @@
                 </a:solidFill>
                 <a:latin typeface="IPAPGothic"/>
               </a:rPr>
-              <a:t>富の継承は解決済み。意味の継承は手つかず。</a:t>
+              <a:t>目標は消えるから、ブレる。</a:t>
             </a:r>
           </a:p>
         </p:txBody>
@@ -4407,7 +4408,7 @@
                 </a:solidFill>
                 <a:latin typeface="IPAPGothic"/>
               </a:rPr>
-              <a:t>相続設計、事業承継、資産運用——「何を渡すか」の仕組みは整っています。しかし「なぜそれを残すのか」という物語は、制度では設計できません。</a:t>
+              <a:t>手帳に書いた抱負は年末に忘れている。デジタルのメモは通知の洪水に埋もれる。人が軸を保てないのは、意志が弱いからではない。言葉が消えるからです。消えない形で刻まれた言葉だけが、軸として機能し続けます。</a:t>
             </a:r>
           </a:p>
         </p:txBody>
@@ -4538,7 +4539,7 @@
                 </a:solidFill>
                 <a:latin typeface="IPAPGothic"/>
               </a:rPr>
-              <a:t>存在証明は、未来への贈り物である。</a:t>
+              <a:t>「未来の自分」は、脳にとって他人である。</a:t>
             </a:r>
           </a:p>
         </p:txBody>
@@ -4581,7 +4582,7 @@
                 </a:solidFill>
                 <a:latin typeface="IPAPGothic"/>
               </a:rPr>
-              <a:t>あなたが残すものは、未来の誰かへの贈り物になります。家族に、地域に、まだ生まれていない世代に。「自分が確かに存在した」という証が、未来の誰かの支えになる。</a:t>
+              <a:t>心理学者ハーシュフィールドのfMRI研究によれば、「未来の自分」は脳の活動パターンにおいて「他人」と同じように処理されます。しかし「千年残る」という重みが、未来の自分の臨場感を引き上げる。永続記録の不可逆性が、未来の自分を「他人」から「自分」に引き戻します。</a:t>
             </a:r>
           </a:p>
         </p:txBody>
@@ -4857,7 +4858,7 @@
                 </a:solidFill>
                 <a:latin typeface="IPAPGothic"/>
               </a:rPr>
-              <a:t>あなたが買うのは「プロダクト」ではない。千年の視座を持つ人間との対話である。</a:t>
+              <a:t>あなたが買うのは「プロダクト」ではありません。未来の自分と出会うための対話です。</a:t>
             </a:r>
           </a:p>
         </p:txBody>
@@ -5029,8 +5030,8 @@
                 </a:solidFill>
                 <a:latin typeface="IPAPGothic"/>
               </a:rPr>
-              <a:t>千年の視座を持つ人間との対話から、
-あなたの存在証明を設計します。</a:t>
+              <a:t>未来の自分の声を聴き、
+ブレない軸を永続化する。</a:t>
             </a:r>
           </a:p>
         </p:txBody>
@@ -5161,7 +5162,7 @@
                 </a:solidFill>
                 <a:latin typeface="IPAPGothic"/>
               </a:rPr>
-              <a:t>千年の問いとの対話</a:t>
+              <a:t>未来の自分との対話</a:t>
             </a:r>
           </a:p>
         </p:txBody>
@@ -5204,7 +5205,7 @@
                 </a:solidFill>
                 <a:latin typeface="IPAPGothic"/>
               </a:rPr>
-              <a:t>「100年後に何を残すか」——心理学・宗教・経済・AI・宇宙まで9領域の思想フレームワークで向き合います。</a:t>
+              <a:t>「未来の自分は、今の自分に何を言うか」——この問いに、9領域の思想フレームワークで向き合います。浮かんだ言葉は、あなただけのものです。</a:t>
             </a:r>
           </a:p>
         </p:txBody>
@@ -5335,7 +5336,7 @@
                 </a:solidFill>
                 <a:latin typeface="IPAPGothic"/>
               </a:rPr>
-              <a:t>存在証明のデザイン</a:t>
+              <a:t>軸の言語化</a:t>
             </a:r>
           </a:p>
         </p:txBody>
@@ -5378,7 +5379,7 @@
                 </a:solidFill>
                 <a:latin typeface="IPAPGothic"/>
               </a:rPr>
-              <a:t>あなたの物語・価値観・メッセージを構造化し、千年先まで届く「存在証明」として設計します。</a:t>
+              <a:t>対話から浮かんだ言葉を、あなたの人生の物語・価値観とともに構造化。「ブレない軸」として言語化し、千年先まで届く形に設計します。</a:t>
             </a:r>
           </a:p>
         </p:txBody>
@@ -5509,7 +5510,7 @@
                 </a:solidFill>
                 <a:latin typeface="IPAPGothic"/>
               </a:rPr>
-              <a:t>石英ガラスへの刻印</a:t>
+              <a:t>ブレない軸の永続化</a:t>
             </a:r>
           </a:p>
         </p:txBody>
@@ -5552,7 +5553,7 @@
                 </a:solidFill>
                 <a:latin typeface="IPAPGothic"/>
               </a:rPr>
-              <a:t>サーバー・電源・制度に依存しない、1000年耐久（理論値）の記録媒体。スマホカメラだけで読み取り可能。</a:t>
+              <a:t>言語化された軸を、消えない形で刻む。千年残るという重みが不可逆の約束になる。消える言葉では軸にならない。トキストレージだからこそ成立する、自己変容の装置。</a:t>
             </a:r>
           </a:p>
         </p:txBody>
@@ -5683,7 +5684,7 @@
                 </a:solidFill>
                 <a:latin typeface="IPAPGothic"/>
               </a:rPr>
-              <a:t>継続的なキュレーション</a:t>
+              <a:t>三層分散保管への格納</a:t>
             </a:r>
           </a:p>
         </p:txBody>
@@ -5726,7 +5727,7 @@
                 </a:solidFill>
                 <a:latin typeface="IPAPGothic"/>
               </a:rPr>
-              <a:t>人生は一度で語りきれません。節目ごとに存在証明をアップデートし、千年アーカイブを育てます。</a:t>
+              <a:t>あなたの軸と存在証明を三層に分散保管。物理層（石英ガラス）、国家層（国立国会図書館）、民間層（GitHub）──単一障害点のない構造で、千年先まで届けます。</a:t>
             </a:r>
           </a:p>
         </p:txBody>
@@ -6002,7 +6003,7 @@
                 </a:solidFill>
                 <a:latin typeface="IPAPGothic"/>
               </a:rPr>
-              <a:t>対話から始まり、千年に届く。4つのステップであなたの存在証明が形になる。</a:t>
+              <a:t>対話から始まり、三層の分散保管で千年に届く</a:t>
             </a:r>
           </a:p>
         </p:txBody>
@@ -6262,7 +6263,7 @@
                 </a:solidFill>
                 <a:latin typeface="IPAPGothic"/>
               </a:rPr>
-              <a:t>「100年後に何を残したいか」を軸に、あなたの人生の物語を聴かせていただきます。この対話自体が、深い内省の機会になります。</a:t>
+              <a:t>「未来の自分は、今の自分に何を言うか」を軸に、あなたの人生の物語を聴かせていただきます。この対話自体が、多くの方にとって深い内省の機会になります。</a:t>
             </a:r>
           </a:p>
         </p:txBody>
@@ -6436,7 +6437,7 @@
                 </a:solidFill>
                 <a:latin typeface="IPAPGothic"/>
               </a:rPr>
-              <a:t>存在証明の設計</a:t>
+              <a:t>ブレない軸の言語化</a:t>
             </a:r>
           </a:p>
         </p:txBody>
@@ -6479,7 +6480,7 @@
                 </a:solidFill>
                 <a:latin typeface="IPAPGothic"/>
               </a:rPr>
-              <a:t>対話をもとに、何を・誰に・どんな形で残すかを設計します。テキスト、写真、音声、映像——最適なメディアを提案。</a:t>
+              <a:t>未来の自分を想像し、その視座から今の自分への言葉を紡ぎます。存在証明の構造設計と同時に、あなたの「ブレない軸」を言葉にするプロセスです。</a:t>
             </a:r>
           </a:p>
         </p:txBody>
@@ -6653,7 +6654,7 @@
                 </a:solidFill>
                 <a:latin typeface="IPAPGothic"/>
               </a:rPr>
-              <a:t>コンテンツの制作・キュレーション</a:t>
+              <a:t>コンテンツの制作</a:t>
             </a:r>
           </a:p>
         </p:txBody>
@@ -6696,7 +6697,7 @@
                 </a:solidFill>
                 <a:latin typeface="IPAPGothic"/>
               </a:rPr>
-              <a:t>設計に基づいて存在証明を制作。必要に応じてプロフェッショナルな撮影・収録・編集をコーディネート。</a:t>
+              <a:t>設計に基づいて、あなたの存在証明を制作します。必要に応じて、プロフェッショナルな撮影・収録・編集をコーディネート。あなたの物語と軸を最高の形に仕上げます。</a:t>
             </a:r>
           </a:p>
         </p:txBody>
@@ -6870,7 +6871,7 @@
                 </a:solidFill>
                 <a:latin typeface="IPAPGothic"/>
               </a:rPr>
-              <a:t>石英ガラスへの刻印・納品</a:t>
+              <a:t>三層分散保管・納品</a:t>
             </a:r>
           </a:p>
         </p:txBody>
@@ -6913,7 +6914,7 @@
                 </a:solidFill>
                 <a:latin typeface="IPAPGothic"/>
               </a:rPr>
-              <a:t>完成した存在証明を石英ガラスに刻印し、QRコードとともにお届け。1000年先の誰かがあなたの物語に出会えます。</a:t>
+              <a:t>存在証明とブレない軸を三層に格納。石英ガラスへの刻印（物理層）、国立国会図書館への納本（国家層）、GitHubへの分散保管（民間層）。QRコードを読み取るたびに、未来の自分があなたに語りかけます。</a:t>
             </a:r>
           </a:p>
         </p:txBody>
@@ -7189,7 +7190,7 @@
                 </a:solidFill>
                 <a:latin typeface="IPAPGothic"/>
               </a:rPr>
-              <a:t>「残す」ことに意味を感じるすべての方へ——6つの領域で特に高い親和性がある</a:t>
+              <a:t>ブレない軸を必要としている、すべての方へ</a:t>
             </a:r>
           </a:p>
         </p:txBody>
@@ -7232,7 +7233,7 @@
                 </a:solidFill>
                 <a:latin typeface="IPAPGothic"/>
               </a:rPr>
-              <a:t>WHO THIS IS FOR</a:t>
+              <a:t>WHO THIS IS TOR</a:t>
             </a:r>
           </a:p>
         </p:txBody>
@@ -7449,7 +7450,7 @@
                 </a:solidFill>
                 <a:latin typeface="IPAPGothic"/>
               </a:rPr>
-              <a:t>会社を超えて残る、あなた自身の理念と物語を</a:t>
+              <a:t>事業の浮き沈みに揺れない、自分自身の理念を軸として永続化したい</a:t>
             </a:r>
           </a:p>
         </p:txBody>
@@ -7580,7 +7581,7 @@
                 </a:solidFill>
                 <a:latin typeface="IPAPGothic"/>
               </a:rPr>
-              <a:t>F</a:t>
+              <a:t>T</a:t>
             </a:r>
           </a:p>
         </p:txBody>
@@ -7623,7 +7624,7 @@
                 </a:solidFill>
                 <a:latin typeface="IPAPGothic"/>
               </a:rPr>
-              <a:t>家族の記録を残す方</a:t>
+              <a:t>人生の転機にいる方</a:t>
             </a:r>
           </a:p>
         </p:txBody>
@@ -7666,7 +7667,7 @@
                 </a:solidFill>
                 <a:latin typeface="IPAPGothic"/>
               </a:rPr>
-              <a:t>家族の歴史、想い出、伝えたい言葉を千年先へ</a:t>
+              <a:t>転職、独立、退職——次の一歩を踏み出す前に、ブレない軸を言語化したい</a:t>
             </a:r>
           </a:p>
         </p:txBody>
@@ -7840,7 +7841,7 @@
                 </a:solidFill>
                 <a:latin typeface="IPAPGothic"/>
               </a:rPr>
-              <a:t>宗教者・文化人</a:t>
+              <a:t>家族に軸を残したい方</a:t>
             </a:r>
           </a:p>
         </p:txBody>
@@ -7883,7 +7884,7 @@
                 </a:solidFill>
                 <a:latin typeface="IPAPGothic"/>
               </a:rPr>
-              <a:t>教え、作品、精神的遺産を制度に依存せず永続化</a:t>
+              <a:t>子や孫に伝えたいのは財産ではなく、生き方の軸。消えない形で届けたい</a:t>
             </a:r>
           </a:p>
         </p:txBody>
@@ -8057,7 +8058,7 @@
                 </a:solidFill>
                 <a:latin typeface="IPAPGothic"/>
               </a:rPr>
-              <a:t>アーティスト</a:t>
+              <a:t>アーティスト・クリエイター</a:t>
             </a:r>
           </a:p>
         </p:txBody>
@@ -8100,7 +8101,7 @@
                 </a:solidFill>
                 <a:latin typeface="IPAPGothic"/>
               </a:rPr>
-              <a:t>作品と創作の意図を、プラットフォームを超えて残す</a:t>
+              <a:t>創作の原点を見失わないために、自分の軸をプラットフォームに依存せず刻みたい</a:t>
             </a:r>
           </a:p>
         </p:txBody>
@@ -8274,7 +8275,7 @@
                 </a:solidFill>
                 <a:latin typeface="IPAPGothic"/>
               </a:rPr>
-              <a:t>地域・コミュニティ</a:t>
+              <a:t>宗教者・教育者</a:t>
             </a:r>
           </a:p>
         </p:txBody>
@@ -8317,7 +8318,7 @@
                 </a:solidFill>
                 <a:latin typeface="IPAPGothic"/>
               </a:rPr>
-              <a:t>まちの記憶、お祭り、方言、災害の教訓を未来に</a:t>
+              <a:t>教えの本質を、自分がいなくなっても消えない形で次の世代に手渡したい</a:t>
             </a:r>
           </a:p>
         </p:txBody>
@@ -8491,7 +8492,7 @@
                 </a:solidFill>
                 <a:latin typeface="IPAPGothic"/>
               </a:rPr>
-              <a:t>教育者・研究者</a:t>
+              <a:t>地域・コミュニティ</a:t>
             </a:r>
           </a:p>
         </p:txBody>
@@ -8534,7 +8535,7 @@
                 </a:solidFill>
                 <a:latin typeface="IPAPGothic"/>
               </a:rPr>
-              <a:t>知の系譜、発見の文脈、師弟の物語を永続的に記録</a:t>
+              <a:t>まちの精神、災害の教訓、創設の志──組織の軸を人の寿命から解放したい</a:t>
             </a:r>
           </a:p>
         </p:txBody>
@@ -8810,7 +8811,7 @@
                 </a:solidFill>
                 <a:latin typeface="IPAPGothic"/>
               </a:rPr>
-              <a:t>対話から生まれる、3つの具体的な成果物。千年先まで届く「かたち」をお届けします。</a:t>
+              <a:t>対話から生まれ、三層に分散保管される具体的な成果物</a:t>
             </a:r>
           </a:p>
         </p:txBody>
@@ -9244,7 +9245,7 @@
                 </a:solidFill>
                 <a:latin typeface="IPAPGothic"/>
               </a:rPr>
-              <a:t>デジタルコンパニオン</a:t>
+              <a:t>未来の自分からの言葉──ブレない軸の永続化</a:t>
             </a:r>
           </a:p>
         </p:txBody>
@@ -9287,7 +9288,7 @@
                 </a:solidFill>
                 <a:latin typeface="IPAPGothic"/>
               </a:rPr>
-              <a:t>QRコードを読み取ると表示されるデジタルページ。テキスト、写真、音声、映像を含む、存在証明のリッチな体験版。</a:t>
+              <a:t>「千年残る」という重みが、未来の自分の臨場感を引き上げる。その未来の自分から今のあなたへ投げかけられた言葉を、三層に永続化する。消えないからこそ、ブレない軸になる。</a:t>
             </a:r>
           </a:p>
         </p:txBody>
@@ -9504,7 +9505,7 @@
                 </a:solidFill>
                 <a:latin typeface="IPAPGothic"/>
               </a:rPr>
-              <a:t>あなたの存在証明を、70以上の思想エッセイの文脈に位置づけたレポート。「なぜ残すのか」の知的な裏付け。</a:t>
+              <a:t>あなたの存在証明を、70以上の思想エッセイの文脈に位置づけたレポート。「なぜ残すのか」の知的な裏付けを提供します。</a:t>
             </a:r>
           </a:p>
         </p:txBody>
@@ -9780,7 +9781,7 @@
                 </a:solidFill>
                 <a:latin typeface="IPAPGothic"/>
               </a:rPr>
-              <a:t>体験プラン5,000円から——あなたに合ったかたちで始められます</a:t>
+              <a:t>未来の自分からの言葉を、どこまで深く刻むか</a:t>
             </a:r>
           </a:p>
         </p:txBody>
@@ -10040,7 +10041,7 @@
                 </a:solidFill>
                 <a:latin typeface="IPAPGothic"/>
               </a:rPr>
-              <a:t>三層保管をA4ラミネートで体験。声のQRコード→ラミネート＋NDL納本＋GitHub格納。まずはここから。</a:t>
+              <a:t>「未来の自分は何を言うか」──その最初の一言を声で刻み、三層に格納する体験。A4ラミネート＋国立国会図書館納本＋GitHub。まだ軸が見えなくても、ここから始まります。</a:t>
             </a:r>
           </a:p>
         </p:txBody>
@@ -10257,7 +10258,7 @@
                 </a:solidFill>
                 <a:latin typeface="IPAPGothic"/>
               </a:rPr>
-              <a:t>石英ガラスに刻印。年あたり50円の存在証明。1000年耐久（理論値）。</a:t>
+              <a:t>対話から生まれたブレない軸を、石英ガラスに刻む。千年残る不可逆の約束が、日常の中で軸として機能し続ける。年あたり50円の自己変容装置。</a:t>
             </a:r>
           </a:p>
         </p:txBody>
@@ -10474,7 +10475,7 @@
                 </a:solidFill>
                 <a:latin typeface="IPAPGothic"/>
               </a:rPr>
-              <a:t>家族3名分＋佐渡島での現地刻印体験。お墓・仏壇の代替として。最も選ばれるプラン。</a:t>
+              <a:t>三世代先の子孫から今の自分に投げかける言葉を刻む。その言葉を受け取った瞬間、未来世代への責任が自覚になる。お墓や仏壇は風化するが、軸は消えない。世代を超えて対話が続く。</a:t>
             </a:r>
           </a:p>
         </p:txBody>
@@ -10691,7 +10692,7 @@
                 </a:solidFill>
                 <a:latin typeface="IPAPGothic"/>
               </a:rPr>
-              <a:t>完全オーダーメイド。音声復元・専用デザイン・プレミアム体験のすべてを含む。</a:t>
+              <a:t>声そのものを千年先に届ける。音声復元技術を含む完全オーダーメイド。未来の子孫がQRコードを読み取ったとき、あなたの肉声が語りかける。</a:t>
             </a:r>
           </a:p>
         </p:txBody>
@@ -12532,7 +12533,7 @@
                 </a:solidFill>
                 <a:latin typeface="IPAPGothic"/>
               </a:rPr>
-              <a:t>「100年後に何を残したいか」を一緒に考える、最初の90分</a:t>
+              <a:t>「未来の自分は今の自分に何を言うか」を一緒に探る、最初の90分</a:t>
             </a:r>
           </a:p>
         </p:txBody>
@@ -12661,7 +12662,7 @@
                 </a:solidFill>
                 <a:latin typeface="IPAPGothic"/>
               </a:rPr>
-              <a:t>存在証明の設計ご提案</a:t>
+              <a:t>ブレない軸の言語化</a:t>
             </a:r>
           </a:p>
         </p:txBody>
@@ -12704,7 +12705,7 @@
                 </a:solidFill>
                 <a:latin typeface="IPAPGothic"/>
               </a:rPr>
-              <a:t>対話をもとに、あなただけのプランをお作りします</a:t>
+              <a:t>未来の自分の視座から、今の自分への言葉を紡ぎます</a:t>
             </a:r>
           </a:p>
         </p:txBody>
@@ -12833,7 +12834,7 @@
                 </a:solidFill>
                 <a:latin typeface="IPAPGothic"/>
               </a:rPr>
-              <a:t>制作・刻印</a:t>
+              <a:t>制作・三層分散保管</a:t>
             </a:r>
           </a:p>
         </p:txBody>
@@ -12876,7 +12877,7 @@
                 </a:solidFill>
                 <a:latin typeface="IPAPGothic"/>
               </a:rPr>
-              <a:t>存在証明を制作し、石英ガラスに永久に刻みます</a:t>
+              <a:t>存在証明とブレない軸を、物理・国家・民間の三層に格納します</a:t>
             </a:r>
           </a:p>
         </p:txBody>
@@ -13005,7 +13006,7 @@
                 </a:solidFill>
                 <a:latin typeface="IPAPGothic"/>
               </a:rPr>
-              <a:t>納品・キュレーション開始</a:t>
+              <a:t>納品</a:t>
             </a:r>
           </a:p>
         </p:txBody>
@@ -13048,7 +13049,7 @@
                 </a:solidFill>
                 <a:latin typeface="IPAPGothic"/>
               </a:rPr>
-              <a:t>お届けし、継続的なアップデートをサポートします</a:t>
+              <a:t>QRコードを読み取るたびに、未来の自分が語りかけます</a:t>
             </a:r>
           </a:p>
         </p:txBody>

</xml_diff>